<commit_message>
PPT Mistake again Pb Num diapo
</commit_message>
<xml_diff>
--- a/English_project.pptx
+++ b/English_project.pptx
@@ -1,6 +1,6 @@
 
 <file path=ppt/presentation.xml><?xml version="1.0" encoding="utf-8"?>
-<p:presentation xmlns:a="http://schemas.openxmlformats.org/drawingml/2006/main" xmlns:r="http://schemas.openxmlformats.org/officeDocument/2006/relationships" xmlns:p="http://schemas.openxmlformats.org/presentationml/2006/main" strictFirstAndLastChars="0" saveSubsetFonts="1" autoCompressPictures="0">
+<p:presentation xmlns:a="http://schemas.openxmlformats.org/drawingml/2006/main" xmlns:r="http://schemas.openxmlformats.org/officeDocument/2006/relationships" xmlns:p="http://schemas.openxmlformats.org/presentationml/2006/main" showSpecialPlsOnTitleSld="0" strictFirstAndLastChars="0" saveSubsetFonts="1" autoCompressPictures="0">
   <p:sldMasterIdLst>
     <p:sldMasterId id="2147483834" r:id="rId1"/>
   </p:sldMasterIdLst>
@@ -243,7 +243,7 @@
   </p:defaultTextStyle>
   <p:extLst>
     <p:ext uri="{EFAFB233-063F-42B5-8137-9DF3F51BA10A}">
-      <p15:sldGuideLst xmlns:p15="http://schemas.microsoft.com/office/powerpoint/2012/main">
+      <p15:sldGuideLst xmlns:p15="http://schemas.microsoft.com/office/powerpoint/2012/main" xmlns="">
         <p15:guide id="1" orient="horz" pos="2160">
           <p15:clr>
             <a:srgbClr val="A4A3A4"/>
@@ -257,7 +257,7 @@
       </p15:sldGuideLst>
     </p:ext>
     <p:ext uri="{2D200454-40CA-4A62-9FC3-DE9A4176ACB9}">
-      <p15:notesGuideLst xmlns:p15="http://schemas.microsoft.com/office/powerpoint/2012/main"/>
+      <p15:notesGuideLst xmlns:p15="http://schemas.microsoft.com/office/powerpoint/2012/main" xmlns=""/>
     </p:ext>
   </p:extLst>
 </p:presentation>
@@ -3811,11 +3811,7 @@
           </a:r>
           <a:r>
             <a:rPr lang="fr-FR" dirty="0" smtClean="0"/>
-            <a:t> </a:t>
-          </a:r>
-          <a:r>
-            <a:rPr lang="fr-FR" dirty="0" smtClean="0"/>
-            <a:t>the </a:t>
+            <a:t> the </a:t>
           </a:r>
           <a:r>
             <a:rPr lang="fr-FR" dirty="0" err="1" smtClean="0"/>
@@ -5807,11 +5803,7 @@
           </a:r>
           <a:r>
             <a:rPr lang="fr-FR" sz="1500" kern="1200" dirty="0" smtClean="0"/>
-            <a:t> </a:t>
-          </a:r>
-          <a:r>
-            <a:rPr lang="fr-FR" sz="1500" kern="1200" dirty="0" smtClean="0"/>
-            <a:t>the </a:t>
+            <a:t> the </a:t>
           </a:r>
           <a:r>
             <a:rPr lang="fr-FR" sz="1500" kern="1200" dirty="0" err="1" smtClean="0"/>
@@ -24145,16 +24137,28 @@
               <a:t>Improve your </a:t>
             </a:r>
             <a:r>
+              <a:rPr lang="en-US" dirty="0" err="1">
+                <a:sym typeface="Georgia"/>
+              </a:rPr>
+              <a:t>e</a:t>
+            </a:r>
+            <a:r>
               <a:rPr lang="en-US" dirty="0" err="1" smtClean="0">
                 <a:sym typeface="Georgia"/>
               </a:rPr>
-              <a:t>english</a:t>
+              <a:t>nglish</a:t>
             </a:r>
             <a:r>
               <a:rPr lang="en-US" dirty="0" smtClean="0">
                 <a:sym typeface="Georgia"/>
               </a:rPr>
-              <a:t> by listening to music</a:t>
+              <a:t> </a:t>
+            </a:r>
+            <a:r>
+              <a:rPr lang="en-US" dirty="0" smtClean="0">
+                <a:sym typeface="Georgia"/>
+              </a:rPr>
+              <a:t>by listening to music</a:t>
             </a:r>
           </a:p>
           <a:p>
@@ -24181,13 +24185,7 @@
               <a:rPr lang="en-US" dirty="0" smtClean="0">
                 <a:sym typeface="Georgia"/>
               </a:rPr>
-              <a:t>New features can be </a:t>
-            </a:r>
-            <a:r>
-              <a:rPr lang="en-US" dirty="0" err="1" smtClean="0">
-                <a:sym typeface="Georgia"/>
-              </a:rPr>
-              <a:t>developped</a:t>
+              <a:t>Some features to add, to improve</a:t>
             </a:r>
             <a:endParaRPr lang="en-US" dirty="0" smtClean="0">
               <a:sym typeface="Georgia"/>
@@ -24341,26 +24339,9 @@
           <a:lstStyle/>
           <a:p>
             <a:r>
-              <a:rPr lang="fr-FR" dirty="0" err="1" smtClean="0"/>
-              <a:t>Improve</a:t>
-            </a:r>
-            <a:r>
-              <a:rPr lang="fr-FR" dirty="0" smtClean="0"/>
-              <a:t> the </a:t>
-            </a:r>
-            <a:r>
-              <a:rPr lang="fr-FR" dirty="0" err="1" smtClean="0"/>
-              <a:t>behavior</a:t>
-            </a:r>
-            <a:r>
-              <a:rPr lang="fr-FR" dirty="0" smtClean="0"/>
-              <a:t> of the </a:t>
-            </a:r>
-            <a:r>
-              <a:rPr lang="fr-FR" dirty="0" err="1" smtClean="0"/>
-              <a:t>process</a:t>
-            </a:r>
-            <a:endParaRPr lang="fr-FR" dirty="0"/>
+              <a:rPr lang="en-US" dirty="0" smtClean="0"/>
+              <a:t>Improve the behavior of the process</a:t>
+            </a:r>
           </a:p>
           <a:p>
             <a:pPr lvl="1"/>
@@ -24423,26 +24404,11 @@
           <a:p>
             <a:pPr lvl="1"/>
             <a:r>
-              <a:rPr lang="en-US" dirty="0">
-                <a:sym typeface="Georgia"/>
-              </a:rPr>
-              <a:t>Consider </a:t>
-            </a:r>
-            <a:r>
               <a:rPr lang="en-US" dirty="0" smtClean="0">
                 <a:sym typeface="Georgia"/>
               </a:rPr>
-              <a:t>above </a:t>
-            </a:r>
-            <a:r>
-              <a:rPr lang="en-US" dirty="0" err="1" smtClean="0">
-                <a:sym typeface="Georgia"/>
-              </a:rPr>
-              <a:t>changements</a:t>
-            </a:r>
-            <a:endParaRPr lang="en-US" dirty="0" smtClean="0">
-              <a:sym typeface="Georgia"/>
-            </a:endParaRPr>
+              <a:t>Consider above changes</a:t>
+            </a:r>
           </a:p>
           <a:p>
             <a:pPr lvl="1"/>
@@ -24569,10 +24535,10 @@
               <a:t>Add and modify user’s </a:t>
             </a:r>
             <a:r>
-              <a:rPr lang="en-US" dirty="0" err="1">
+              <a:rPr lang="en-US" dirty="0" smtClean="0">
                 <a:sym typeface="Georgia"/>
               </a:rPr>
-              <a:t>informations</a:t>
+              <a:t>information</a:t>
             </a:r>
             <a:endParaRPr lang="en-US" dirty="0">
               <a:sym typeface="Georgia"/>
@@ -24645,16 +24611,28 @@
               <a:t>Evolution of </a:t>
             </a:r>
             <a:r>
+              <a:rPr lang="en-US" dirty="0" err="1">
+                <a:sym typeface="Georgia"/>
+              </a:rPr>
+              <a:t>e</a:t>
+            </a:r>
+            <a:r>
               <a:rPr lang="en-US" dirty="0" err="1" smtClean="0">
                 <a:sym typeface="Georgia"/>
               </a:rPr>
-              <a:t>english</a:t>
+              <a:t>nglish</a:t>
             </a:r>
             <a:r>
               <a:rPr lang="en-US" dirty="0" smtClean="0">
                 <a:sym typeface="Georgia"/>
               </a:rPr>
-              <a:t> level</a:t>
+              <a:t> </a:t>
+            </a:r>
+            <a:r>
+              <a:rPr lang="en-US" dirty="0" smtClean="0">
+                <a:sym typeface="Georgia"/>
+              </a:rPr>
+              <a:t>level</a:t>
             </a:r>
           </a:p>
           <a:p>
@@ -25767,10 +25745,10 @@
               <a:t>Missing </a:t>
             </a:r>
             <a:r>
-              <a:rPr lang="en-US" dirty="0" err="1" smtClean="0">
+              <a:rPr lang="en-US" dirty="0" smtClean="0">
                 <a:sym typeface="Georgia"/>
               </a:rPr>
-              <a:t>informations</a:t>
+              <a:t>information</a:t>
             </a:r>
             <a:endParaRPr lang="en-US" dirty="0" smtClean="0">
               <a:sym typeface="Georgia"/>
@@ -25852,15 +25830,7 @@
             <a:pPr lvl="1"/>
             <a:r>
               <a:rPr lang="en-US" dirty="0" smtClean="0"/>
-              <a:t>Opportunity to </a:t>
-            </a:r>
-            <a:r>
-              <a:rPr lang="en-US" dirty="0" smtClean="0"/>
-              <a:t>develop </a:t>
-            </a:r>
-            <a:r>
-              <a:rPr lang="en-US" dirty="0" smtClean="0"/>
-              <a:t>an interesting software</a:t>
+              <a:t>Opportunity to develop an interesting software</a:t>
             </a:r>
           </a:p>
           <a:p>
@@ -27885,13 +27855,7 @@
               <a:rPr lang="en-US" dirty="0" smtClean="0">
                 <a:sym typeface="Georgia"/>
               </a:rPr>
-              <a:t>Now</a:t>
-            </a:r>
-            <a:r>
-              <a:rPr lang="en-US" dirty="0" smtClean="0">
-                <a:sym typeface="Georgia"/>
-              </a:rPr>
-              <a:t>, let move onto the demonstration of our game</a:t>
+              <a:t>Now, let move onto the demonstration of our game</a:t>
             </a:r>
             <a:endParaRPr lang="en-US" dirty="0">
               <a:sym typeface="Georgia"/>
@@ -28221,7 +28185,7 @@
   <a:extraClrSchemeLst/>
   <a:extLst>
     <a:ext uri="{05A4C25C-085E-4340-85A3-A5531E510DB2}">
-      <thm15:themeFamily xmlns:thm15="http://schemas.microsoft.com/office/thememl/2012/main" name="Facet" id="{C0C680CD-088A-49FC-A102-D699147F32B2}" vid="{0B5AB586-D108-4FC1-8368-649FE654B894}"/>
+      <thm15:themeFamily xmlns:thm15="http://schemas.microsoft.com/office/thememl/2012/main" xmlns="" name="Facet" id="{C0C680CD-088A-49FC-A102-D699147F32B2}" vid="{0B5AB586-D108-4FC1-8368-649FE654B894}"/>
     </a:ext>
   </a:extLst>
 </a:theme>
@@ -28761,7 +28725,7 @@
   <a:extraClrSchemeLst/>
   <a:extLst>
     <a:ext uri="{05A4C25C-085E-4340-85A3-A5531E510DB2}">
-      <thm15:themeFamily xmlns:thm15="http://schemas.microsoft.com/office/thememl/2012/main" name="Office Theme" id="{62F939B6-93AF-4DB8-9C6B-D6C7DFDC589F}" vid="{4A3C46E8-61CC-4603-A589-7422A47A8E4A}"/>
+      <thm15:themeFamily xmlns:thm15="http://schemas.microsoft.com/office/thememl/2012/main" xmlns="" name="Office Theme" id="{62F939B6-93AF-4DB8-9C6B-D6C7DFDC589F}" vid="{4A3C46E8-61CC-4603-A589-7422A47A8E4A}"/>
     </a:ext>
   </a:extLst>
 </a:theme>

</xml_diff>